<commit_message>
Improved labels of Figure 5
</commit_message>
<xml_diff>
--- a/fig5/Figure_5.pptx
+++ b/fig5/Figure_5.pptx
@@ -136,7 +136,7 @@
           <a:lstStyle/>
           <a:p>
             <a:pPr>
-              <a:defRPr sz="1400" b="1" i="0" u="none" strike="noStrike" kern="1200" spc="0" baseline="0">
+              <a:defRPr sz="3600" b="1" i="0" u="none" strike="noStrike" kern="1200" spc="0" baseline="0">
                 <a:solidFill>
                   <a:schemeClr val="tx1">
                     <a:lumMod val="65000"/>
@@ -149,12 +149,12 @@
               </a:defRPr>
             </a:pPr>
             <a:r>
-              <a:rPr lang="en-US" sz="2400" b="1" i="0" baseline="0" dirty="0">
+              <a:rPr lang="en-US" sz="3600" b="1" i="0" baseline="0" dirty="0">
                 <a:effectLst/>
               </a:rPr>
-              <a:t>Figure 5: Foreign Direct Investment in the U.S., Financial Inflow Transactions Without Current-Cost Adjustment </a:t>
-            </a:r>
-            <a:endParaRPr lang="en-US" sz="2400" b="1" dirty="0">
+              <a:t>Figure 5: Foreign Direct Investment in the U.S.</a:t>
+            </a:r>
+            <a:endParaRPr lang="en-US" sz="3600" b="1" dirty="0">
               <a:effectLst/>
             </a:endParaRPr>
           </a:p>
@@ -181,7 +181,7 @@
         <a:lstStyle/>
         <a:p>
           <a:pPr>
-            <a:defRPr sz="1400" b="1" i="0" u="none" strike="noStrike" kern="1200" spc="0" baseline="0">
+            <a:defRPr sz="3600" b="1" i="0" u="none" strike="noStrike" kern="1200" spc="0" baseline="0">
               <a:solidFill>
                 <a:schemeClr val="tx1">
                   <a:lumMod val="65000"/>
@@ -841,8 +841,8 @@
                   </a:defRPr>
                 </a:pPr>
                 <a:r>
-                  <a:rPr lang="en-US" sz="1400" b="1"/>
-                  <a:t>USD in Billions</a:t>
+                  <a:rPr lang="en-US" sz="1400" b="1" dirty="0"/>
+                  <a:t>USD in Billions (Overall)</a:t>
                 </a:r>
               </a:p>
             </c:rich>
@@ -918,6 +918,66 @@
         </c:scaling>
         <c:delete val="0"/>
         <c:axPos val="r"/>
+        <c:title>
+          <c:tx>
+            <c:rich>
+              <a:bodyPr rot="-5400000" spcFirstLastPara="1" vertOverflow="ellipsis" vert="horz" wrap="square" anchor="ctr" anchorCtr="1"/>
+              <a:lstStyle/>
+              <a:p>
+                <a:pPr>
+                  <a:defRPr sz="1000" b="0" i="0" u="none" strike="noStrike" kern="1200" baseline="0">
+                    <a:solidFill>
+                      <a:schemeClr val="tx1">
+                        <a:lumMod val="65000"/>
+                        <a:lumOff val="35000"/>
+                      </a:schemeClr>
+                    </a:solidFill>
+                    <a:latin typeface="+mn-lt"/>
+                    <a:ea typeface="+mn-ea"/>
+                    <a:cs typeface="+mn-cs"/>
+                  </a:defRPr>
+                </a:pPr>
+                <a:r>
+                  <a:rPr lang="en-US" sz="1400" b="1" dirty="0"/>
+                  <a:t>Eastern Bloc &amp; China Investments</a:t>
+                </a:r>
+                <a:r>
+                  <a:rPr lang="en-US" sz="1400" b="1" baseline="0" dirty="0"/>
+                  <a:t> in Billions (USD)</a:t>
+                </a:r>
+                <a:endParaRPr lang="en-US" sz="1400" b="1" dirty="0"/>
+              </a:p>
+            </c:rich>
+          </c:tx>
+          <c:overlay val="0"/>
+          <c:spPr>
+            <a:noFill/>
+            <a:ln>
+              <a:noFill/>
+            </a:ln>
+            <a:effectLst/>
+          </c:spPr>
+          <c:txPr>
+            <a:bodyPr rot="-5400000" spcFirstLastPara="1" vertOverflow="ellipsis" vert="horz" wrap="square" anchor="ctr" anchorCtr="1"/>
+            <a:lstStyle/>
+            <a:p>
+              <a:pPr>
+                <a:defRPr sz="1000" b="0" i="0" u="none" strike="noStrike" kern="1200" baseline="0">
+                  <a:solidFill>
+                    <a:schemeClr val="tx1">
+                      <a:lumMod val="65000"/>
+                      <a:lumOff val="35000"/>
+                    </a:schemeClr>
+                  </a:solidFill>
+                  <a:latin typeface="+mn-lt"/>
+                  <a:ea typeface="+mn-ea"/>
+                  <a:cs typeface="+mn-cs"/>
+                </a:defRPr>
+              </a:pPr>
+              <a:endParaRPr lang="en-US"/>
+            </a:p>
+          </c:txPr>
+        </c:title>
         <c:numFmt formatCode="General" sourceLinked="1"/>
         <c:majorTickMark val="out"/>
         <c:minorTickMark val="none"/>
@@ -994,7 +1054,7 @@
         <a:lstStyle/>
         <a:p>
           <a:pPr>
-            <a:defRPr sz="900" b="0" i="0" u="none" strike="noStrike" kern="1200" baseline="0">
+            <a:defRPr sz="1800" b="0" i="0" u="none" strike="noStrike" kern="1200" baseline="0">
               <a:solidFill>
                 <a:schemeClr val="tx1">
                   <a:lumMod val="65000"/>
@@ -1709,7 +1769,7 @@
           <a:p>
             <a:fld id="{E6088F24-141A-2F45-920C-D3B2EA431DDA}" type="datetimeFigureOut">
               <a:rPr lang="en-US" smtClean="0"/>
-              <a:t>8/9/23</a:t>
+              <a:t>8/26/23</a:t>
             </a:fld>
             <a:endParaRPr lang="en-US"/>
           </a:p>
@@ -2227,7 +2287,7 @@
           <a:p>
             <a:fld id="{989209AD-DE80-1247-BEBA-53A96105D619}" type="datetimeFigureOut">
               <a:rPr lang="en-US" smtClean="0"/>
-              <a:t>8/9/23</a:t>
+              <a:t>8/26/23</a:t>
             </a:fld>
             <a:endParaRPr lang="en-US"/>
           </a:p>
@@ -2425,7 +2485,7 @@
           <a:p>
             <a:fld id="{989209AD-DE80-1247-BEBA-53A96105D619}" type="datetimeFigureOut">
               <a:rPr lang="en-US" smtClean="0"/>
-              <a:t>8/9/23</a:t>
+              <a:t>8/26/23</a:t>
             </a:fld>
             <a:endParaRPr lang="en-US"/>
           </a:p>
@@ -2633,7 +2693,7 @@
           <a:p>
             <a:fld id="{989209AD-DE80-1247-BEBA-53A96105D619}" type="datetimeFigureOut">
               <a:rPr lang="en-US" smtClean="0"/>
-              <a:t>8/9/23</a:t>
+              <a:t>8/26/23</a:t>
             </a:fld>
             <a:endParaRPr lang="en-US"/>
           </a:p>
@@ -2831,7 +2891,7 @@
           <a:p>
             <a:fld id="{989209AD-DE80-1247-BEBA-53A96105D619}" type="datetimeFigureOut">
               <a:rPr lang="en-US" smtClean="0"/>
-              <a:t>8/9/23</a:t>
+              <a:t>8/26/23</a:t>
             </a:fld>
             <a:endParaRPr lang="en-US"/>
           </a:p>
@@ -3106,7 +3166,7 @@
           <a:p>
             <a:fld id="{989209AD-DE80-1247-BEBA-53A96105D619}" type="datetimeFigureOut">
               <a:rPr lang="en-US" smtClean="0"/>
-              <a:t>8/9/23</a:t>
+              <a:t>8/26/23</a:t>
             </a:fld>
             <a:endParaRPr lang="en-US"/>
           </a:p>
@@ -3371,7 +3431,7 @@
           <a:p>
             <a:fld id="{989209AD-DE80-1247-BEBA-53A96105D619}" type="datetimeFigureOut">
               <a:rPr lang="en-US" smtClean="0"/>
-              <a:t>8/9/23</a:t>
+              <a:t>8/26/23</a:t>
             </a:fld>
             <a:endParaRPr lang="en-US"/>
           </a:p>
@@ -3783,7 +3843,7 @@
           <a:p>
             <a:fld id="{989209AD-DE80-1247-BEBA-53A96105D619}" type="datetimeFigureOut">
               <a:rPr lang="en-US" smtClean="0"/>
-              <a:t>8/9/23</a:t>
+              <a:t>8/26/23</a:t>
             </a:fld>
             <a:endParaRPr lang="en-US"/>
           </a:p>
@@ -3924,7 +3984,7 @@
           <a:p>
             <a:fld id="{989209AD-DE80-1247-BEBA-53A96105D619}" type="datetimeFigureOut">
               <a:rPr lang="en-US" smtClean="0"/>
-              <a:t>8/9/23</a:t>
+              <a:t>8/26/23</a:t>
             </a:fld>
             <a:endParaRPr lang="en-US"/>
           </a:p>
@@ -4037,7 +4097,7 @@
           <a:p>
             <a:fld id="{989209AD-DE80-1247-BEBA-53A96105D619}" type="datetimeFigureOut">
               <a:rPr lang="en-US" smtClean="0"/>
-              <a:t>8/9/23</a:t>
+              <a:t>8/26/23</a:t>
             </a:fld>
             <a:endParaRPr lang="en-US"/>
           </a:p>
@@ -4348,7 +4408,7 @@
           <a:p>
             <a:fld id="{989209AD-DE80-1247-BEBA-53A96105D619}" type="datetimeFigureOut">
               <a:rPr lang="en-US" smtClean="0"/>
-              <a:t>8/9/23</a:t>
+              <a:t>8/26/23</a:t>
             </a:fld>
             <a:endParaRPr lang="en-US"/>
           </a:p>
@@ -4636,7 +4696,7 @@
           <a:p>
             <a:fld id="{989209AD-DE80-1247-BEBA-53A96105D619}" type="datetimeFigureOut">
               <a:rPr lang="en-US" smtClean="0"/>
-              <a:t>8/9/23</a:t>
+              <a:t>8/26/23</a:t>
             </a:fld>
             <a:endParaRPr lang="en-US"/>
           </a:p>
@@ -4877,7 +4937,7 @@
           <a:p>
             <a:fld id="{989209AD-DE80-1247-BEBA-53A96105D619}" type="datetimeFigureOut">
               <a:rPr lang="en-US" smtClean="0"/>
-              <a:t>8/9/23</a:t>
+              <a:t>8/26/23</a:t>
             </a:fld>
             <a:endParaRPr lang="en-US"/>
           </a:p>
@@ -5309,7 +5369,7 @@
           <p:nvPr>
             <p:extLst>
               <p:ext uri="{D42A27DB-BD31-4B8C-83A1-F6EECF244321}">
-                <p14:modId xmlns:p14="http://schemas.microsoft.com/office/powerpoint/2010/main" val="1985575423"/>
+                <p14:modId xmlns:p14="http://schemas.microsoft.com/office/powerpoint/2010/main" val="2631620762"/>
               </p:ext>
             </p:extLst>
           </p:nvPr>

</xml_diff>